<commit_message>
Added links to the presentation. Removed some logging statements
</commit_message>
<xml_diff>
--- a/realtimeco-presentation.pptx
+++ b/realtimeco-presentation.pptx
@@ -200,7 +200,7 @@
           <a:p>
             <a:fld id="{4D5B76B1-25A2-6A4E-B201-264FA8DEF473}" type="datetimeFigureOut">
               <a:rPr lang="en-US" smtClean="0"/>
-              <a:t>12/12/12</a:t>
+              <a:t>12/13/12</a:t>
             </a:fld>
             <a:endParaRPr lang="en-US"/>
           </a:p>
@@ -1257,7 +1257,7 @@
           <a:p>
             <a:fld id="{679BC7E7-EA8E-4DA7-915E-CC098D9BADCB}" type="datetimeFigureOut">
               <a:rPr lang="en-US" smtClean="0"/>
-              <a:t>12/12/12</a:t>
+              <a:t>12/13/12</a:t>
             </a:fld>
             <a:endParaRPr lang="en-US"/>
           </a:p>
@@ -1386,7 +1386,7 @@
           <a:p>
             <a:fld id="{679BC7E7-EA8E-4DA7-915E-CC098D9BADCB}" type="datetimeFigureOut">
               <a:rPr lang="en-US" smtClean="0"/>
-              <a:t>12/12/12</a:t>
+              <a:t>12/13/12</a:t>
             </a:fld>
             <a:endParaRPr lang="en-US"/>
           </a:p>
@@ -1691,7 +1691,7 @@
           <a:p>
             <a:fld id="{679BC7E7-EA8E-4DA7-915E-CC098D9BADCB}" type="datetimeFigureOut">
               <a:rPr lang="en-US" smtClean="0"/>
-              <a:t>12/12/12</a:t>
+              <a:t>12/13/12</a:t>
             </a:fld>
             <a:endParaRPr lang="en-US"/>
           </a:p>
@@ -1916,7 +1916,7 @@
           <a:p>
             <a:fld id="{679BC7E7-EA8E-4DA7-915E-CC098D9BADCB}" type="datetimeFigureOut">
               <a:rPr lang="en-US" smtClean="0"/>
-              <a:t>12/12/12</a:t>
+              <a:t>12/13/12</a:t>
             </a:fld>
             <a:endParaRPr lang="en-US"/>
           </a:p>
@@ -2186,7 +2186,7 @@
           <a:p>
             <a:fld id="{679BC7E7-EA8E-4DA7-915E-CC098D9BADCB}" type="datetimeFigureOut">
               <a:rPr lang="en-US" smtClean="0"/>
-              <a:t>12/12/12</a:t>
+              <a:t>12/13/12</a:t>
             </a:fld>
             <a:endParaRPr lang="en-US"/>
           </a:p>
@@ -2511,7 +2511,7 @@
           <a:p>
             <a:fld id="{679BC7E7-EA8E-4DA7-915E-CC098D9BADCB}" type="datetimeFigureOut">
               <a:rPr lang="en-US" smtClean="0"/>
-              <a:t>12/12/12</a:t>
+              <a:t>12/13/12</a:t>
             </a:fld>
             <a:endParaRPr lang="en-US"/>
           </a:p>
@@ -2704,7 +2704,7 @@
           <a:p>
             <a:fld id="{679BC7E7-EA8E-4DA7-915E-CC098D9BADCB}" type="datetimeFigureOut">
               <a:rPr lang="en-US" smtClean="0"/>
-              <a:t>12/12/12</a:t>
+              <a:t>12/13/12</a:t>
             </a:fld>
             <a:endParaRPr lang="en-US"/>
           </a:p>
@@ -2808,7 +2808,7 @@
           <a:p>
             <a:fld id="{679BC7E7-EA8E-4DA7-915E-CC098D9BADCB}" type="datetimeFigureOut">
               <a:rPr lang="en-US" smtClean="0"/>
-              <a:t>12/12/12</a:t>
+              <a:t>12/13/12</a:t>
             </a:fld>
             <a:endParaRPr lang="en-US"/>
           </a:p>
@@ -2977,7 +2977,7 @@
           <a:p>
             <a:fld id="{679BC7E7-EA8E-4DA7-915E-CC098D9BADCB}" type="datetimeFigureOut">
               <a:rPr lang="en-US" smtClean="0"/>
-              <a:t>12/12/12</a:t>
+              <a:t>12/13/12</a:t>
             </a:fld>
             <a:endParaRPr lang="en-US"/>
           </a:p>
@@ -3241,7 +3241,7 @@
           <a:p>
             <a:fld id="{679BC7E7-EA8E-4DA7-915E-CC098D9BADCB}" type="datetimeFigureOut">
               <a:rPr lang="en-US" smtClean="0"/>
-              <a:t>12/12/12</a:t>
+              <a:t>12/13/12</a:t>
             </a:fld>
             <a:endParaRPr lang="en-US"/>
           </a:p>
@@ -3575,7 +3575,7 @@
           <a:p>
             <a:fld id="{679BC7E7-EA8E-4DA7-915E-CC098D9BADCB}" type="datetimeFigureOut">
               <a:rPr lang="en-US" smtClean="0"/>
-              <a:t>12/12/12</a:t>
+              <a:t>12/13/12</a:t>
             </a:fld>
             <a:endParaRPr lang="en-US"/>
           </a:p>
@@ -4016,7 +4016,7 @@
           <a:p>
             <a:fld id="{679BC7E7-EA8E-4DA7-915E-CC098D9BADCB}" type="datetimeFigureOut">
               <a:rPr lang="en-US" smtClean="0"/>
-              <a:t>12/12/12</a:t>
+              <a:t>12/13/12</a:t>
             </a:fld>
             <a:endParaRPr lang="en-US"/>
           </a:p>
@@ -4214,7 +4214,7 @@
           <a:p>
             <a:fld id="{679BC7E7-EA8E-4DA7-915E-CC098D9BADCB}" type="datetimeFigureOut">
               <a:rPr lang="en-US" smtClean="0"/>
-              <a:t>12/12/12</a:t>
+              <a:t>12/13/12</a:t>
             </a:fld>
             <a:endParaRPr lang="en-US"/>
           </a:p>
@@ -4497,7 +4497,7 @@
           <a:p>
             <a:fld id="{679BC7E7-EA8E-4DA7-915E-CC098D9BADCB}" type="datetimeFigureOut">
               <a:rPr lang="en-US" smtClean="0"/>
-              <a:t>12/12/12</a:t>
+              <a:t>12/13/12</a:t>
             </a:fld>
             <a:endParaRPr lang="en-US"/>
           </a:p>
@@ -4865,7 +4865,7 @@
           <a:p>
             <a:fld id="{679BC7E7-EA8E-4DA7-915E-CC098D9BADCB}" type="datetimeFigureOut">
               <a:rPr lang="en-US" smtClean="0"/>
-              <a:t>12/12/12</a:t>
+              <a:t>12/13/12</a:t>
             </a:fld>
             <a:endParaRPr lang="en-US"/>
           </a:p>
@@ -5361,7 +5361,7 @@
           <a:p>
             <a:fld id="{679BC7E7-EA8E-4DA7-915E-CC098D9BADCB}" type="datetimeFigureOut">
               <a:rPr lang="en-US" smtClean="0"/>
-              <a:t>12/12/12</a:t>
+              <a:t>12/13/12</a:t>
             </a:fld>
             <a:endParaRPr lang="en-US"/>
           </a:p>
@@ -5570,7 +5570,7 @@
           <a:p>
             <a:fld id="{679BC7E7-EA8E-4DA7-915E-CC098D9BADCB}" type="datetimeFigureOut">
               <a:rPr lang="en-US" smtClean="0"/>
-              <a:t>12/12/12</a:t>
+              <a:t>12/13/12</a:t>
             </a:fld>
             <a:endParaRPr lang="en-US"/>
           </a:p>
@@ -6039,15 +6039,7 @@
           <a:p>
             <a:r>
               <a:rPr lang="en-US" dirty="0" smtClean="0"/>
-              <a:t>Real</a:t>
-            </a:r>
-            <a:r>
-              <a:rPr lang="en-US" dirty="0" smtClean="0"/>
-              <a:t>-time </a:t>
-            </a:r>
-            <a:r>
-              <a:rPr lang="en-US" dirty="0" smtClean="0"/>
-              <a:t>application with ORTC</a:t>
+              <a:t>Real-time application with ORTC</a:t>
             </a:r>
             <a:endParaRPr lang="en-US" dirty="0"/>
           </a:p>
@@ -6130,15 +6122,7 @@
           <a:p>
             <a:r>
               <a:rPr lang="en-US" dirty="0" smtClean="0"/>
-              <a:t>Getting data to </a:t>
-            </a:r>
-            <a:r>
-              <a:rPr lang="en-US" dirty="0" smtClean="0"/>
-              <a:t>website </a:t>
-            </a:r>
-            <a:r>
-              <a:rPr lang="en-US" dirty="0" smtClean="0"/>
-              <a:t>visitors</a:t>
+              <a:t>Getting data to website visitors</a:t>
             </a:r>
             <a:endParaRPr lang="en-US" dirty="0"/>
           </a:p>
@@ -6165,14 +6149,12 @@
               <a:rPr lang="en-US" dirty="0" smtClean="0"/>
               <a:t>Usually requested by visitor</a:t>
             </a:r>
-            <a:endParaRPr lang="en-US" dirty="0" smtClean="0"/>
           </a:p>
           <a:p>
             <a:r>
               <a:rPr lang="en-US" dirty="0" smtClean="0"/>
               <a:t>Solutions exist to simulate pushing data from server</a:t>
             </a:r>
-            <a:endParaRPr lang="en-US" dirty="0" smtClean="0"/>
           </a:p>
           <a:p>
             <a:pPr lvl="1"/>
@@ -6187,7 +6169,6 @@
               <a:rPr lang="en-US" dirty="0" smtClean="0"/>
               <a:t>long polling</a:t>
             </a:r>
-            <a:endParaRPr lang="en-US" dirty="0" smtClean="0"/>
           </a:p>
           <a:p>
             <a:pPr lvl="1"/>
@@ -6214,28 +6195,19 @@
               <a:rPr lang="en-US" dirty="0" smtClean="0"/>
               <a:t>meant to solve this problem</a:t>
             </a:r>
-            <a:endParaRPr lang="en-US" dirty="0" smtClean="0"/>
           </a:p>
           <a:p>
             <a:pPr lvl="1"/>
             <a:r>
               <a:rPr lang="en-US" dirty="0" smtClean="0"/>
-              <a:t>requires </a:t>
-            </a:r>
+              <a:t>requires new implementation for each application</a:t>
+            </a:r>
+          </a:p>
+          <a:p>
+            <a:pPr lvl="1"/>
             <a:r>
               <a:rPr lang="en-US" dirty="0" smtClean="0"/>
-              <a:t>new implementation for each application</a:t>
-            </a:r>
-          </a:p>
-          <a:p>
-            <a:pPr lvl="1"/>
-            <a:r>
-              <a:rPr lang="en-US" dirty="0" smtClean="0"/>
-              <a:t>multiple </a:t>
-            </a:r>
-            <a:r>
-              <a:rPr lang="en-US" dirty="0" smtClean="0"/>
-              <a:t>versions of the protocol</a:t>
+              <a:t>multiple versions of the protocol</a:t>
             </a:r>
           </a:p>
           <a:p>
@@ -6246,11 +6218,7 @@
             </a:r>
             <a:r>
               <a:rPr lang="en-US" dirty="0" smtClean="0"/>
-              <a:t>aintaining </a:t>
-            </a:r>
-            <a:r>
-              <a:rPr lang="en-US" dirty="0" smtClean="0"/>
-              <a:t>the infrastructure</a:t>
+              <a:t>aintaining the infrastructure</a:t>
             </a:r>
           </a:p>
           <a:p>
@@ -6314,7 +6282,6 @@
               <a:rPr lang="en-US" dirty="0" smtClean="0"/>
               <a:t>Publish/Subscribe mechanism</a:t>
             </a:r>
-            <a:endParaRPr lang="en-US" dirty="0" smtClean="0"/>
           </a:p>
           <a:p>
             <a:r>
@@ -6327,7 +6294,6 @@
               <a:rPr lang="en-US" dirty="0" smtClean="0"/>
               <a:t>Implementations for different platforms</a:t>
             </a:r>
-            <a:endParaRPr lang="en-US" dirty="0" smtClean="0"/>
           </a:p>
           <a:p>
             <a:r>
@@ -6536,13 +6502,8 @@
           <a:p>
             <a:r>
               <a:rPr lang="en-US" dirty="0" smtClean="0"/>
-              <a:t>Library is quite </a:t>
-            </a:r>
-            <a:r>
-              <a:rPr lang="en-US" dirty="0" smtClean="0"/>
-              <a:t>large (200kB minified version)</a:t>
-            </a:r>
-            <a:endParaRPr lang="en-US" dirty="0" smtClean="0"/>
+              <a:t>Library is quite large (200kB minified version)</a:t>
+            </a:r>
           </a:p>
           <a:p>
             <a:r>
@@ -6652,7 +6613,6 @@
               <a:rPr lang="en-US" dirty="0" smtClean="0"/>
               <a:t>)</a:t>
             </a:r>
-            <a:endParaRPr lang="en-US" dirty="0" smtClean="0"/>
           </a:p>
           <a:p>
             <a:pPr lvl="1"/>
@@ -6782,7 +6742,9 @@
         </p:nvSpPr>
         <p:spPr/>
         <p:txBody>
-          <a:bodyPr/>
+          <a:bodyPr>
+            <a:normAutofit fontScale="92500" lnSpcReduction="20000"/>
+          </a:bodyPr>
           <a:lstStyle/>
           <a:p>
             <a:r>
@@ -6821,8 +6783,42 @@
             <a:pPr lvl="1"/>
             <a:r>
               <a:rPr lang="en-US" dirty="0" smtClean="0"/>
-              <a:t>API -&gt; Visitor</a:t>
-            </a:r>
+              <a:t>API -&gt; </a:t>
+            </a:r>
+            <a:r>
+              <a:rPr lang="en-US" dirty="0" smtClean="0"/>
+              <a:t>Visitor</a:t>
+            </a:r>
+          </a:p>
+          <a:p>
+            <a:r>
+              <a:rPr lang="en-US" dirty="0">
+                <a:hlinkClick r:id="rId2"/>
+              </a:rPr>
+              <a:t>http://v.gd/</a:t>
+            </a:r>
+            <a:r>
+              <a:rPr lang="en-US" dirty="0" smtClean="0">
+                <a:hlinkClick r:id="rId2"/>
+              </a:rPr>
+              <a:t>omg_audience</a:t>
+            </a:r>
+            <a:endParaRPr lang="en-US" dirty="0" smtClean="0"/>
+          </a:p>
+          <a:p>
+            <a:r>
+              <a:rPr lang="en-US" dirty="0">
+                <a:hlinkClick r:id="rId3"/>
+              </a:rPr>
+              <a:t>http://v.gd/</a:t>
+            </a:r>
+            <a:r>
+              <a:rPr lang="en-US" dirty="0" smtClean="0">
+                <a:hlinkClick r:id="rId3"/>
+              </a:rPr>
+              <a:t>omg_speaker</a:t>
+            </a:r>
+            <a:endParaRPr lang="en-US" dirty="0" smtClean="0"/>
           </a:p>
           <a:p>
             <a:endParaRPr lang="en-US" dirty="0"/>

</xml_diff>